<commit_message>
Update preprocessing and descriptive checks / inspections
</commit_message>
<xml_diff>
--- a/doc/SAP/dag.pptx
+++ b/doc/SAP/dag.pptx
@@ -4,6 +4,9 @@
   <p:sldMasterIdLst>
     <p:sldMasterId id="2147483672" r:id="rId1"/>
   </p:sldMasterIdLst>
+  <p:notesMasterIdLst>
+    <p:notesMasterId r:id="rId3"/>
+  </p:notesMasterIdLst>
   <p:sldIdLst>
     <p:sldId id="256" r:id="rId2"/>
   </p:sldIdLst>
@@ -112,6 +115,440 @@
 </p:presentation>
 </file>
 
+<file path=ppt/notesMasters/notesMaster1.xml><?xml version="1.0" encoding="utf-8"?>
+<p:notesMaster xmlns:a="http://schemas.openxmlformats.org/drawingml/2006/main" xmlns:r="http://schemas.openxmlformats.org/officeDocument/2006/relationships" xmlns:p="http://schemas.openxmlformats.org/presentationml/2006/main">
+  <p:cSld>
+    <p:bg>
+      <p:bgRef idx="1001">
+        <a:schemeClr val="bg1"/>
+      </p:bgRef>
+    </p:bg>
+    <p:spTree>
+      <p:nvGrpSpPr>
+        <p:cNvPr id="1" name=""/>
+        <p:cNvGrpSpPr/>
+        <p:nvPr/>
+      </p:nvGrpSpPr>
+      <p:grpSpPr>
+        <a:xfrm>
+          <a:off x="0" y="0"/>
+          <a:ext cx="0" cy="0"/>
+          <a:chOff x="0" y="0"/>
+          <a:chExt cx="0" cy="0"/>
+        </a:xfrm>
+      </p:grpSpPr>
+      <p:sp>
+        <p:nvSpPr>
+          <p:cNvPr id="2" name="Header Placeholder 1"/>
+          <p:cNvSpPr>
+            <a:spLocks noGrp="1"/>
+          </p:cNvSpPr>
+          <p:nvPr>
+            <p:ph type="hdr" sz="quarter"/>
+          </p:nvPr>
+        </p:nvSpPr>
+        <p:spPr>
+          <a:xfrm>
+            <a:off x="0" y="0"/>
+            <a:ext cx="2971800" cy="458788"/>
+          </a:xfrm>
+          <a:prstGeom prst="rect">
+            <a:avLst/>
+          </a:prstGeom>
+        </p:spPr>
+        <p:txBody>
+          <a:bodyPr vert="horz" lIns="91440" tIns="45720" rIns="91440" bIns="45720" rtlCol="0"/>
+          <a:lstStyle>
+            <a:lvl1pPr algn="l">
+              <a:defRPr sz="1200"/>
+            </a:lvl1pPr>
+          </a:lstStyle>
+          <a:p>
+            <a:endParaRPr lang="en-CH"/>
+          </a:p>
+        </p:txBody>
+      </p:sp>
+      <p:sp>
+        <p:nvSpPr>
+          <p:cNvPr id="3" name="Date Placeholder 2"/>
+          <p:cNvSpPr>
+            <a:spLocks noGrp="1"/>
+          </p:cNvSpPr>
+          <p:nvPr>
+            <p:ph type="dt" idx="1"/>
+          </p:nvPr>
+        </p:nvSpPr>
+        <p:spPr>
+          <a:xfrm>
+            <a:off x="3884613" y="0"/>
+            <a:ext cx="2971800" cy="458788"/>
+          </a:xfrm>
+          <a:prstGeom prst="rect">
+            <a:avLst/>
+          </a:prstGeom>
+        </p:spPr>
+        <p:txBody>
+          <a:bodyPr vert="horz" lIns="91440" tIns="45720" rIns="91440" bIns="45720" rtlCol="0"/>
+          <a:lstStyle>
+            <a:lvl1pPr algn="r">
+              <a:defRPr sz="1200"/>
+            </a:lvl1pPr>
+          </a:lstStyle>
+          <a:p>
+            <a:fld id="{3D24DBBF-5864-5745-97E7-62946D789ADE}" type="datetimeFigureOut">
+              <a:rPr lang="en-CH" smtClean="0"/>
+              <a:t>14.05.2024</a:t>
+            </a:fld>
+            <a:endParaRPr lang="en-CH"/>
+          </a:p>
+        </p:txBody>
+      </p:sp>
+      <p:sp>
+        <p:nvSpPr>
+          <p:cNvPr id="4" name="Slide Image Placeholder 3"/>
+          <p:cNvSpPr>
+            <a:spLocks noGrp="1" noRot="1" noChangeAspect="1"/>
+          </p:cNvSpPr>
+          <p:nvPr>
+            <p:ph type="sldImg" idx="2"/>
+          </p:nvPr>
+        </p:nvSpPr>
+        <p:spPr>
+          <a:xfrm>
+            <a:off x="2355850" y="1143000"/>
+            <a:ext cx="2146300" cy="3086100"/>
+          </a:xfrm>
+          <a:prstGeom prst="rect">
+            <a:avLst/>
+          </a:prstGeom>
+          <a:noFill/>
+          <a:ln w="12700">
+            <a:solidFill>
+              <a:prstClr val="black"/>
+            </a:solidFill>
+          </a:ln>
+        </p:spPr>
+        <p:txBody>
+          <a:bodyPr vert="horz" lIns="91440" tIns="45720" rIns="91440" bIns="45720" rtlCol="0" anchor="ctr"/>
+          <a:lstStyle/>
+          <a:p>
+            <a:endParaRPr lang="en-CH"/>
+          </a:p>
+        </p:txBody>
+      </p:sp>
+      <p:sp>
+        <p:nvSpPr>
+          <p:cNvPr id="5" name="Notes Placeholder 4"/>
+          <p:cNvSpPr>
+            <a:spLocks noGrp="1"/>
+          </p:cNvSpPr>
+          <p:nvPr>
+            <p:ph type="body" sz="quarter" idx="3"/>
+          </p:nvPr>
+        </p:nvSpPr>
+        <p:spPr>
+          <a:xfrm>
+            <a:off x="685800" y="4400550"/>
+            <a:ext cx="5486400" cy="3600450"/>
+          </a:xfrm>
+          <a:prstGeom prst="rect">
+            <a:avLst/>
+          </a:prstGeom>
+        </p:spPr>
+        <p:txBody>
+          <a:bodyPr vert="horz" lIns="91440" tIns="45720" rIns="91440" bIns="45720" rtlCol="0"/>
+          <a:lstStyle/>
+          <a:p>
+            <a:pPr lvl="0"/>
+            <a:r>
+              <a:rPr lang="en-GB"/>
+              <a:t>Click to edit Master text styles</a:t>
+            </a:r>
+          </a:p>
+          <a:p>
+            <a:pPr lvl="1"/>
+            <a:r>
+              <a:rPr lang="en-GB"/>
+              <a:t>Second level</a:t>
+            </a:r>
+          </a:p>
+          <a:p>
+            <a:pPr lvl="2"/>
+            <a:r>
+              <a:rPr lang="en-GB"/>
+              <a:t>Third level</a:t>
+            </a:r>
+          </a:p>
+          <a:p>
+            <a:pPr lvl="3"/>
+            <a:r>
+              <a:rPr lang="en-GB"/>
+              <a:t>Fourth level</a:t>
+            </a:r>
+          </a:p>
+          <a:p>
+            <a:pPr lvl="4"/>
+            <a:r>
+              <a:rPr lang="en-GB"/>
+              <a:t>Fifth level</a:t>
+            </a:r>
+            <a:endParaRPr lang="en-CH"/>
+          </a:p>
+        </p:txBody>
+      </p:sp>
+      <p:sp>
+        <p:nvSpPr>
+          <p:cNvPr id="6" name="Footer Placeholder 5"/>
+          <p:cNvSpPr>
+            <a:spLocks noGrp="1"/>
+          </p:cNvSpPr>
+          <p:nvPr>
+            <p:ph type="ftr" sz="quarter" idx="4"/>
+          </p:nvPr>
+        </p:nvSpPr>
+        <p:spPr>
+          <a:xfrm>
+            <a:off x="0" y="8685213"/>
+            <a:ext cx="2971800" cy="458787"/>
+          </a:xfrm>
+          <a:prstGeom prst="rect">
+            <a:avLst/>
+          </a:prstGeom>
+        </p:spPr>
+        <p:txBody>
+          <a:bodyPr vert="horz" lIns="91440" tIns="45720" rIns="91440" bIns="45720" rtlCol="0" anchor="b"/>
+          <a:lstStyle>
+            <a:lvl1pPr algn="l">
+              <a:defRPr sz="1200"/>
+            </a:lvl1pPr>
+          </a:lstStyle>
+          <a:p>
+            <a:endParaRPr lang="en-CH"/>
+          </a:p>
+        </p:txBody>
+      </p:sp>
+      <p:sp>
+        <p:nvSpPr>
+          <p:cNvPr id="7" name="Slide Number Placeholder 6"/>
+          <p:cNvSpPr>
+            <a:spLocks noGrp="1"/>
+          </p:cNvSpPr>
+          <p:nvPr>
+            <p:ph type="sldNum" sz="quarter" idx="5"/>
+          </p:nvPr>
+        </p:nvSpPr>
+        <p:spPr>
+          <a:xfrm>
+            <a:off x="3884613" y="8685213"/>
+            <a:ext cx="2971800" cy="458787"/>
+          </a:xfrm>
+          <a:prstGeom prst="rect">
+            <a:avLst/>
+          </a:prstGeom>
+        </p:spPr>
+        <p:txBody>
+          <a:bodyPr vert="horz" lIns="91440" tIns="45720" rIns="91440" bIns="45720" rtlCol="0" anchor="b"/>
+          <a:lstStyle>
+            <a:lvl1pPr algn="r">
+              <a:defRPr sz="1200"/>
+            </a:lvl1pPr>
+          </a:lstStyle>
+          <a:p>
+            <a:fld id="{45600BE0-5710-D440-9E92-DDA697AB51DB}" type="slidenum">
+              <a:rPr lang="en-CH" smtClean="0"/>
+              <a:t>‹#›</a:t>
+            </a:fld>
+            <a:endParaRPr lang="en-CH"/>
+          </a:p>
+        </p:txBody>
+      </p:sp>
+    </p:spTree>
+    <p:extLst>
+      <p:ext uri="{BB962C8B-B14F-4D97-AF65-F5344CB8AC3E}">
+        <p14:creationId xmlns:p14="http://schemas.microsoft.com/office/powerpoint/2010/main" val="833814171"/>
+      </p:ext>
+    </p:extLst>
+  </p:cSld>
+  <p:clrMap bg1="lt1" tx1="dk1" bg2="lt2" tx2="dk2" accent1="accent1" accent2="accent2" accent3="accent3" accent4="accent4" accent5="accent5" accent6="accent6" hlink="hlink" folHlink="folHlink"/>
+  <p:notesStyle>
+    <a:lvl1pPr marL="0" algn="l" defTabSz="914400" rtl="0" eaLnBrk="1" latinLnBrk="0" hangingPunct="1">
+      <a:defRPr sz="1200" kern="1200">
+        <a:solidFill>
+          <a:schemeClr val="tx1"/>
+        </a:solidFill>
+        <a:latin typeface="+mn-lt"/>
+        <a:ea typeface="+mn-ea"/>
+        <a:cs typeface="+mn-cs"/>
+      </a:defRPr>
+    </a:lvl1pPr>
+    <a:lvl2pPr marL="457200" algn="l" defTabSz="914400" rtl="0" eaLnBrk="1" latinLnBrk="0" hangingPunct="1">
+      <a:defRPr sz="1200" kern="1200">
+        <a:solidFill>
+          <a:schemeClr val="tx1"/>
+        </a:solidFill>
+        <a:latin typeface="+mn-lt"/>
+        <a:ea typeface="+mn-ea"/>
+        <a:cs typeface="+mn-cs"/>
+      </a:defRPr>
+    </a:lvl2pPr>
+    <a:lvl3pPr marL="914400" algn="l" defTabSz="914400" rtl="0" eaLnBrk="1" latinLnBrk="0" hangingPunct="1">
+      <a:defRPr sz="1200" kern="1200">
+        <a:solidFill>
+          <a:schemeClr val="tx1"/>
+        </a:solidFill>
+        <a:latin typeface="+mn-lt"/>
+        <a:ea typeface="+mn-ea"/>
+        <a:cs typeface="+mn-cs"/>
+      </a:defRPr>
+    </a:lvl3pPr>
+    <a:lvl4pPr marL="1371600" algn="l" defTabSz="914400" rtl="0" eaLnBrk="1" latinLnBrk="0" hangingPunct="1">
+      <a:defRPr sz="1200" kern="1200">
+        <a:solidFill>
+          <a:schemeClr val="tx1"/>
+        </a:solidFill>
+        <a:latin typeface="+mn-lt"/>
+        <a:ea typeface="+mn-ea"/>
+        <a:cs typeface="+mn-cs"/>
+      </a:defRPr>
+    </a:lvl4pPr>
+    <a:lvl5pPr marL="1828800" algn="l" defTabSz="914400" rtl="0" eaLnBrk="1" latinLnBrk="0" hangingPunct="1">
+      <a:defRPr sz="1200" kern="1200">
+        <a:solidFill>
+          <a:schemeClr val="tx1"/>
+        </a:solidFill>
+        <a:latin typeface="+mn-lt"/>
+        <a:ea typeface="+mn-ea"/>
+        <a:cs typeface="+mn-cs"/>
+      </a:defRPr>
+    </a:lvl5pPr>
+    <a:lvl6pPr marL="2286000" algn="l" defTabSz="914400" rtl="0" eaLnBrk="1" latinLnBrk="0" hangingPunct="1">
+      <a:defRPr sz="1200" kern="1200">
+        <a:solidFill>
+          <a:schemeClr val="tx1"/>
+        </a:solidFill>
+        <a:latin typeface="+mn-lt"/>
+        <a:ea typeface="+mn-ea"/>
+        <a:cs typeface="+mn-cs"/>
+      </a:defRPr>
+    </a:lvl6pPr>
+    <a:lvl7pPr marL="2743200" algn="l" defTabSz="914400" rtl="0" eaLnBrk="1" latinLnBrk="0" hangingPunct="1">
+      <a:defRPr sz="1200" kern="1200">
+        <a:solidFill>
+          <a:schemeClr val="tx1"/>
+        </a:solidFill>
+        <a:latin typeface="+mn-lt"/>
+        <a:ea typeface="+mn-ea"/>
+        <a:cs typeface="+mn-cs"/>
+      </a:defRPr>
+    </a:lvl7pPr>
+    <a:lvl8pPr marL="3200400" algn="l" defTabSz="914400" rtl="0" eaLnBrk="1" latinLnBrk="0" hangingPunct="1">
+      <a:defRPr sz="1200" kern="1200">
+        <a:solidFill>
+          <a:schemeClr val="tx1"/>
+        </a:solidFill>
+        <a:latin typeface="+mn-lt"/>
+        <a:ea typeface="+mn-ea"/>
+        <a:cs typeface="+mn-cs"/>
+      </a:defRPr>
+    </a:lvl8pPr>
+    <a:lvl9pPr marL="3657600" algn="l" defTabSz="914400" rtl="0" eaLnBrk="1" latinLnBrk="0" hangingPunct="1">
+      <a:defRPr sz="1200" kern="1200">
+        <a:solidFill>
+          <a:schemeClr val="tx1"/>
+        </a:solidFill>
+        <a:latin typeface="+mn-lt"/>
+        <a:ea typeface="+mn-ea"/>
+        <a:cs typeface="+mn-cs"/>
+      </a:defRPr>
+    </a:lvl9pPr>
+  </p:notesStyle>
+</p:notesMaster>
+</file>
+
+<file path=ppt/notesSlides/notesSlide1.xml><?xml version="1.0" encoding="utf-8"?>
+<p:notes xmlns:a="http://schemas.openxmlformats.org/drawingml/2006/main" xmlns:r="http://schemas.openxmlformats.org/officeDocument/2006/relationships" xmlns:p="http://schemas.openxmlformats.org/presentationml/2006/main">
+  <p:cSld>
+    <p:spTree>
+      <p:nvGrpSpPr>
+        <p:cNvPr id="1" name=""/>
+        <p:cNvGrpSpPr/>
+        <p:nvPr/>
+      </p:nvGrpSpPr>
+      <p:grpSpPr>
+        <a:xfrm>
+          <a:off x="0" y="0"/>
+          <a:ext cx="0" cy="0"/>
+          <a:chOff x="0" y="0"/>
+          <a:chExt cx="0" cy="0"/>
+        </a:xfrm>
+      </p:grpSpPr>
+      <p:sp>
+        <p:nvSpPr>
+          <p:cNvPr id="2" name="Slide Image Placeholder 1"/>
+          <p:cNvSpPr>
+            <a:spLocks noGrp="1" noRot="1" noChangeAspect="1"/>
+          </p:cNvSpPr>
+          <p:nvPr>
+            <p:ph type="sldImg"/>
+          </p:nvPr>
+        </p:nvSpPr>
+        <p:spPr/>
+      </p:sp>
+      <p:sp>
+        <p:nvSpPr>
+          <p:cNvPr id="3" name="Notes Placeholder 2"/>
+          <p:cNvSpPr>
+            <a:spLocks noGrp="1"/>
+          </p:cNvSpPr>
+          <p:nvPr>
+            <p:ph type="body" idx="1"/>
+          </p:nvPr>
+        </p:nvSpPr>
+        <p:spPr/>
+        <p:txBody>
+          <a:bodyPr/>
+          <a:lstStyle/>
+          <a:p>
+            <a:endParaRPr lang="en-CH" dirty="0"/>
+          </a:p>
+        </p:txBody>
+      </p:sp>
+      <p:sp>
+        <p:nvSpPr>
+          <p:cNvPr id="4" name="Slide Number Placeholder 3"/>
+          <p:cNvSpPr>
+            <a:spLocks noGrp="1"/>
+          </p:cNvSpPr>
+          <p:nvPr>
+            <p:ph type="sldNum" sz="quarter" idx="5"/>
+          </p:nvPr>
+        </p:nvSpPr>
+        <p:spPr/>
+        <p:txBody>
+          <a:bodyPr/>
+          <a:lstStyle/>
+          <a:p>
+            <a:fld id="{45600BE0-5710-D440-9E92-DDA697AB51DB}" type="slidenum">
+              <a:rPr lang="en-CH" smtClean="0"/>
+              <a:t>1</a:t>
+            </a:fld>
+            <a:endParaRPr lang="en-CH"/>
+          </a:p>
+        </p:txBody>
+      </p:sp>
+    </p:spTree>
+    <p:extLst>
+      <p:ext uri="{BB962C8B-B14F-4D97-AF65-F5344CB8AC3E}">
+        <p14:creationId xmlns:p14="http://schemas.microsoft.com/office/powerpoint/2010/main" val="1646083194"/>
+      </p:ext>
+    </p:extLst>
+  </p:cSld>
+  <p:clrMapOvr>
+    <a:masterClrMapping/>
+  </p:clrMapOvr>
+</p:notes>
+</file>
+
 <file path=ppt/slideLayouts/slideLayout1.xml><?xml version="1.0" encoding="utf-8"?>
 <p:sldLayout xmlns:a="http://schemas.openxmlformats.org/drawingml/2006/main" xmlns:r="http://schemas.openxmlformats.org/officeDocument/2006/relationships" xmlns:p="http://schemas.openxmlformats.org/presentationml/2006/main" type="title" preserve="1">
   <p:cSld name="Title Slide">
@@ -243,7 +680,7 @@
           <a:p>
             <a:fld id="{C75649B4-60E2-BC4A-BCCF-DEAB8A39F9C0}" type="datetimeFigureOut">
               <a:rPr lang="en-CH" smtClean="0"/>
-              <a:t>08.05.2024</a:t>
+              <a:t>13.05.2024</a:t>
             </a:fld>
             <a:endParaRPr lang="en-CH"/>
           </a:p>
@@ -413,7 +850,7 @@
           <a:p>
             <a:fld id="{C75649B4-60E2-BC4A-BCCF-DEAB8A39F9C0}" type="datetimeFigureOut">
               <a:rPr lang="en-CH" smtClean="0"/>
-              <a:t>08.05.2024</a:t>
+              <a:t>13.05.2024</a:t>
             </a:fld>
             <a:endParaRPr lang="en-CH"/>
           </a:p>
@@ -593,7 +1030,7 @@
           <a:p>
             <a:fld id="{C75649B4-60E2-BC4A-BCCF-DEAB8A39F9C0}" type="datetimeFigureOut">
               <a:rPr lang="en-CH" smtClean="0"/>
-              <a:t>08.05.2024</a:t>
+              <a:t>13.05.2024</a:t>
             </a:fld>
             <a:endParaRPr lang="en-CH"/>
           </a:p>
@@ -763,7 +1200,7 @@
           <a:p>
             <a:fld id="{C75649B4-60E2-BC4A-BCCF-DEAB8A39F9C0}" type="datetimeFigureOut">
               <a:rPr lang="en-CH" smtClean="0"/>
-              <a:t>08.05.2024</a:t>
+              <a:t>13.05.2024</a:t>
             </a:fld>
             <a:endParaRPr lang="en-CH"/>
           </a:p>
@@ -1007,7 +1444,7 @@
           <a:p>
             <a:fld id="{C75649B4-60E2-BC4A-BCCF-DEAB8A39F9C0}" type="datetimeFigureOut">
               <a:rPr lang="en-CH" smtClean="0"/>
-              <a:t>08.05.2024</a:t>
+              <a:t>13.05.2024</a:t>
             </a:fld>
             <a:endParaRPr lang="en-CH"/>
           </a:p>
@@ -1239,7 +1676,7 @@
           <a:p>
             <a:fld id="{C75649B4-60E2-BC4A-BCCF-DEAB8A39F9C0}" type="datetimeFigureOut">
               <a:rPr lang="en-CH" smtClean="0"/>
-              <a:t>08.05.2024</a:t>
+              <a:t>13.05.2024</a:t>
             </a:fld>
             <a:endParaRPr lang="en-CH"/>
           </a:p>
@@ -1606,7 +2043,7 @@
           <a:p>
             <a:fld id="{C75649B4-60E2-BC4A-BCCF-DEAB8A39F9C0}" type="datetimeFigureOut">
               <a:rPr lang="en-CH" smtClean="0"/>
-              <a:t>08.05.2024</a:t>
+              <a:t>13.05.2024</a:t>
             </a:fld>
             <a:endParaRPr lang="en-CH"/>
           </a:p>
@@ -1724,7 +2161,7 @@
           <a:p>
             <a:fld id="{C75649B4-60E2-BC4A-BCCF-DEAB8A39F9C0}" type="datetimeFigureOut">
               <a:rPr lang="en-CH" smtClean="0"/>
-              <a:t>08.05.2024</a:t>
+              <a:t>13.05.2024</a:t>
             </a:fld>
             <a:endParaRPr lang="en-CH"/>
           </a:p>
@@ -1819,7 +2256,7 @@
           <a:p>
             <a:fld id="{C75649B4-60E2-BC4A-BCCF-DEAB8A39F9C0}" type="datetimeFigureOut">
               <a:rPr lang="en-CH" smtClean="0"/>
-              <a:t>08.05.2024</a:t>
+              <a:t>13.05.2024</a:t>
             </a:fld>
             <a:endParaRPr lang="en-CH"/>
           </a:p>
@@ -2096,7 +2533,7 @@
           <a:p>
             <a:fld id="{C75649B4-60E2-BC4A-BCCF-DEAB8A39F9C0}" type="datetimeFigureOut">
               <a:rPr lang="en-CH" smtClean="0"/>
-              <a:t>08.05.2024</a:t>
+              <a:t>13.05.2024</a:t>
             </a:fld>
             <a:endParaRPr lang="en-CH"/>
           </a:p>
@@ -2353,7 +2790,7 @@
           <a:p>
             <a:fld id="{C75649B4-60E2-BC4A-BCCF-DEAB8A39F9C0}" type="datetimeFigureOut">
               <a:rPr lang="en-CH" smtClean="0"/>
-              <a:t>08.05.2024</a:t>
+              <a:t>13.05.2024</a:t>
             </a:fld>
             <a:endParaRPr lang="en-CH"/>
           </a:p>
@@ -2566,7 +3003,7 @@
           <a:p>
             <a:fld id="{C75649B4-60E2-BC4A-BCCF-DEAB8A39F9C0}" type="datetimeFigureOut">
               <a:rPr lang="en-CH" smtClean="0"/>
-              <a:t>08.05.2024</a:t>
+              <a:t>13.05.2024</a:t>
             </a:fld>
             <a:endParaRPr lang="en-CH"/>
           </a:p>
@@ -2971,8 +3408,8 @@
           <a:chExt cx="0" cy="0"/>
         </a:xfrm>
       </p:grpSpPr>
-      <mc:AlternateContent xmlns:mc="http://schemas.openxmlformats.org/markup-compatibility/2006">
-        <mc:Choice xmlns:a14="http://schemas.microsoft.com/office/drawing/2010/main" Requires="a14">
+      <mc:AlternateContent xmlns:mc="http://schemas.openxmlformats.org/markup-compatibility/2006" xmlns:a14="http://schemas.microsoft.com/office/drawing/2010/main">
+        <mc:Choice Requires="a14">
           <p:sp>
             <p:nvSpPr>
               <p:cNvPr id="4" name="Rounded Rectangle 3">
@@ -3055,7 +3492,7 @@
             </p:txBody>
           </p:sp>
         </mc:Choice>
-        <mc:Fallback>
+        <mc:Fallback xmlns="">
           <p:sp>
             <p:nvSpPr>
               <p:cNvPr id="4" name="Rounded Rectangle 3">
@@ -3081,7 +3518,7 @@
                 </a:avLst>
               </a:prstGeom>
               <a:blipFill>
-                <a:blip r:embed="rId2"/>
+                <a:blip r:embed="rId3"/>
                 <a:stretch>
                   <a:fillRect/>
                 </a:stretch>
@@ -3234,7 +3671,7 @@
                 </a:avLst>
               </a:prstGeom>
               <a:blipFill>
-                <a:blip r:embed="rId3"/>
+                <a:blip r:embed="rId4"/>
                 <a:stretch>
                   <a:fillRect/>
                 </a:stretch>
@@ -3383,7 +3820,7 @@
                 </a:avLst>
               </a:prstGeom>
               <a:blipFill>
-                <a:blip r:embed="rId4"/>
+                <a:blip r:embed="rId5"/>
                 <a:stretch>
                   <a:fillRect/>
                 </a:stretch>
@@ -3532,7 +3969,7 @@
                 </a:avLst>
               </a:prstGeom>
               <a:blipFill>
-                <a:blip r:embed="rId5"/>
+                <a:blip r:embed="rId6"/>
                 <a:stretch>
                   <a:fillRect/>
                 </a:stretch>
@@ -3663,7 +4100,7 @@
                 </a:avLst>
               </a:prstGeom>
               <a:blipFill>
-                <a:blip r:embed="rId6"/>
+                <a:blip r:embed="rId7"/>
                 <a:stretch>
                   <a:fillRect/>
                 </a:stretch>
@@ -3672,145 +4109,6 @@
                 <a:solidFill>
                   <a:schemeClr val="tx1"/>
                 </a:solidFill>
-              </a:ln>
-            </p:spPr>
-            <p:txBody>
-              <a:bodyPr/>
-              <a:lstStyle/>
-              <a:p>
-                <a:r>
-                  <a:rPr lang="en-CH">
-                    <a:noFill/>
-                  </a:rPr>
-                  <a:t> </a:t>
-                </a:r>
-              </a:p>
-            </p:txBody>
-          </p:sp>
-        </mc:Fallback>
-      </mc:AlternateContent>
-      <mc:AlternateContent xmlns:mc="http://schemas.openxmlformats.org/markup-compatibility/2006" xmlns:a14="http://schemas.microsoft.com/office/drawing/2010/main">
-        <mc:Choice Requires="a14">
-          <p:sp>
-            <p:nvSpPr>
-              <p:cNvPr id="13" name="Rounded Rectangle 12">
-                <a:extLst>
-                  <a:ext uri="{FF2B5EF4-FFF2-40B4-BE49-F238E27FC236}">
-                    <a16:creationId xmlns:a16="http://schemas.microsoft.com/office/drawing/2014/main" id="{F69711EA-12C9-AA73-2E81-8A3EDECD381D}"/>
-                  </a:ext>
-                </a:extLst>
-              </p:cNvPr>
-              <p:cNvSpPr/>
-              <p:nvPr/>
-            </p:nvSpPr>
-            <p:spPr>
-              <a:xfrm>
-                <a:off x="633094" y="6256090"/>
-                <a:ext cx="1032818" cy="691194"/>
-              </a:xfrm>
-              <a:prstGeom prst="roundRect">
-                <a:avLst>
-                  <a:gd name="adj" fmla="val 38506"/>
-                </a:avLst>
-              </a:prstGeom>
-              <a:noFill/>
-              <a:ln w="19050">
-                <a:solidFill>
-                  <a:schemeClr val="tx1"/>
-                </a:solidFill>
-                <a:prstDash val="dash"/>
-              </a:ln>
-            </p:spPr>
-            <p:style>
-              <a:lnRef idx="2">
-                <a:schemeClr val="accent1">
-                  <a:shade val="50000"/>
-                </a:schemeClr>
-              </a:lnRef>
-              <a:fillRef idx="1">
-                <a:schemeClr val="accent1"/>
-              </a:fillRef>
-              <a:effectRef idx="0">
-                <a:schemeClr val="accent1"/>
-              </a:effectRef>
-              <a:fontRef idx="minor">
-                <a:schemeClr val="lt1"/>
-              </a:fontRef>
-            </p:style>
-            <p:txBody>
-              <a:bodyPr rtlCol="0" anchor="ctr"/>
-              <a:lstStyle/>
-              <a:p>
-                <a:pPr algn="ctr"/>
-                <a:r>
-                  <a:rPr lang="en-CH" sz="1000" dirty="0">
-                    <a:solidFill>
-                      <a:sysClr val="windowText" lastClr="000000"/>
-                    </a:solidFill>
-                  </a:rPr>
-                  <a:t>Infectious person-time in the clinic (</a:t>
-                </a:r>
-                <a14:m>
-                  <m:oMath xmlns:m="http://schemas.openxmlformats.org/officeDocument/2006/math">
-                    <m:r>
-                      <a:rPr lang="en-CH" sz="1000" i="1" dirty="0" smtClean="0">
-                        <a:solidFill>
-                          <a:sysClr val="windowText" lastClr="000000"/>
-                        </a:solidFill>
-                        <a:latin typeface="Cambria Math" panose="02040503050406030204" pitchFamily="18" charset="0"/>
-                      </a:rPr>
-                      <m:t>𝐼𝑃𝑇</m:t>
-                    </m:r>
-                  </m:oMath>
-                </a14:m>
-                <a:r>
-                  <a:rPr lang="en-CH" sz="1000" dirty="0">
-                    <a:solidFill>
-                      <a:sysClr val="windowText" lastClr="000000"/>
-                    </a:solidFill>
-                  </a:rPr>
-                  <a:t>)</a:t>
-                </a:r>
-              </a:p>
-            </p:txBody>
-          </p:sp>
-        </mc:Choice>
-        <mc:Fallback xmlns="">
-          <p:sp>
-            <p:nvSpPr>
-              <p:cNvPr id="13" name="Rounded Rectangle 12">
-                <a:extLst>
-                  <a:ext uri="{FF2B5EF4-FFF2-40B4-BE49-F238E27FC236}">
-                    <a16:creationId xmlns:a16="http://schemas.microsoft.com/office/drawing/2014/main" id="{F69711EA-12C9-AA73-2E81-8A3EDECD381D}"/>
-                  </a:ext>
-                </a:extLst>
-              </p:cNvPr>
-              <p:cNvSpPr>
-                <a:spLocks noRot="1" noChangeAspect="1" noMove="1" noResize="1" noEditPoints="1" noAdjustHandles="1" noChangeArrowheads="1" noChangeShapeType="1" noTextEdit="1"/>
-              </p:cNvSpPr>
-              <p:nvPr/>
-            </p:nvSpPr>
-            <p:spPr>
-              <a:xfrm>
-                <a:off x="633094" y="6256090"/>
-                <a:ext cx="1032818" cy="691194"/>
-              </a:xfrm>
-              <a:prstGeom prst="roundRect">
-                <a:avLst>
-                  <a:gd name="adj" fmla="val 38506"/>
-                </a:avLst>
-              </a:prstGeom>
-              <a:blipFill>
-                <a:blip r:embed="rId7"/>
-                <a:stretch>
-                  <a:fillRect b="-3509"/>
-                </a:stretch>
-              </a:blipFill>
-              <a:ln w="19050">
-                <a:solidFill>
-                  <a:schemeClr val="tx1"/>
-                </a:solidFill>
-                <a:prstDash val="dash"/>
               </a:ln>
             </p:spPr>
             <p:txBody>
@@ -3874,8 +4172,8 @@
           </a:fontRef>
         </p:style>
       </p:cxnSp>
-      <mc:AlternateContent xmlns:mc="http://schemas.openxmlformats.org/markup-compatibility/2006" xmlns:a14="http://schemas.microsoft.com/office/drawing/2010/main">
-        <mc:Choice Requires="a14">
+      <mc:AlternateContent xmlns:mc="http://schemas.openxmlformats.org/markup-compatibility/2006">
+        <mc:Choice xmlns:a14="http://schemas.microsoft.com/office/drawing/2010/main" Requires="a14">
           <p:sp>
             <p:nvSpPr>
               <p:cNvPr id="37" name="Rounded Rectangle 36">
@@ -3941,7 +4239,13 @@
                       <a:rPr lang="en-CH" sz="1000" i="1" dirty="0" smtClean="0">
                         <a:latin typeface="Cambria Math" panose="02040503050406030204" pitchFamily="18" charset="0"/>
                       </a:rPr>
-                      <m:t>𝐴𝐶𝐻</m:t>
+                      <m:t>𝐴</m:t>
+                    </m:r>
+                    <m:r>
+                      <a:rPr lang="en-US" sz="1000" b="0" i="1" dirty="0" smtClean="0">
+                        <a:latin typeface="Cambria Math" panose="02040503050406030204" pitchFamily="18" charset="0"/>
+                      </a:rPr>
+                      <m:t>𝐸𝑅</m:t>
                     </m:r>
                   </m:oMath>
                 </a14:m>
@@ -3953,7 +4257,7 @@
             </p:txBody>
           </p:sp>
         </mc:Choice>
-        <mc:Fallback xmlns="">
+        <mc:Fallback>
           <p:sp>
             <p:nvSpPr>
               <p:cNvPr id="37" name="Rounded Rectangle 36">
@@ -4050,209 +4354,6 @@
           </a:fontRef>
         </p:style>
       </p:cxnSp>
-      <p:cxnSp>
-        <p:nvCxnSpPr>
-          <p:cNvPr id="47" name="Straight Arrow Connector 46">
-            <a:extLst>
-              <a:ext uri="{FF2B5EF4-FFF2-40B4-BE49-F238E27FC236}">
-                <a16:creationId xmlns:a16="http://schemas.microsoft.com/office/drawing/2014/main" id="{869ABC9B-442B-EC38-E5C2-022B420FA3C6}"/>
-              </a:ext>
-            </a:extLst>
-          </p:cNvPr>
-          <p:cNvCxnSpPr>
-            <a:cxnSpLocks/>
-            <a:stCxn id="11" idx="3"/>
-            <a:endCxn id="37" idx="1"/>
-          </p:cNvCxnSpPr>
-          <p:nvPr/>
-        </p:nvCxnSpPr>
-        <p:spPr>
-          <a:xfrm flipV="1">
-            <a:off x="2395372" y="3301664"/>
-            <a:ext cx="988771" cy="1172"/>
-          </a:xfrm>
-          <a:prstGeom prst="straightConnector1">
-            <a:avLst/>
-          </a:prstGeom>
-          <a:ln w="19050">
-            <a:solidFill>
-              <a:schemeClr val="tx1"/>
-            </a:solidFill>
-            <a:tailEnd type="triangle"/>
-          </a:ln>
-        </p:spPr>
-        <p:style>
-          <a:lnRef idx="1">
-            <a:schemeClr val="accent1"/>
-          </a:lnRef>
-          <a:fillRef idx="0">
-            <a:schemeClr val="accent1"/>
-          </a:fillRef>
-          <a:effectRef idx="0">
-            <a:schemeClr val="accent1"/>
-          </a:effectRef>
-          <a:fontRef idx="minor">
-            <a:schemeClr val="tx1"/>
-          </a:fontRef>
-        </p:style>
-      </p:cxnSp>
-      <mc:AlternateContent xmlns:mc="http://schemas.openxmlformats.org/markup-compatibility/2006" xmlns:a14="http://schemas.microsoft.com/office/drawing/2010/main">
-        <mc:Choice Requires="a14">
-          <p:sp>
-            <p:nvSpPr>
-              <p:cNvPr id="74" name="Oval 73">
-                <a:extLst>
-                  <a:ext uri="{FF2B5EF4-FFF2-40B4-BE49-F238E27FC236}">
-                    <a16:creationId xmlns:a16="http://schemas.microsoft.com/office/drawing/2014/main" id="{59F0C921-4DDA-CE3F-6775-97CBAB3B83EF}"/>
-                  </a:ext>
-                </a:extLst>
-              </p:cNvPr>
-              <p:cNvSpPr/>
-              <p:nvPr/>
-            </p:nvSpPr>
-            <p:spPr>
-              <a:xfrm>
-                <a:off x="2556389" y="2894483"/>
-                <a:ext cx="316871" cy="316871"/>
-              </a:xfrm>
-              <a:prstGeom prst="ellipse">
-                <a:avLst/>
-              </a:prstGeom>
-              <a:solidFill>
-                <a:schemeClr val="accent6">
-                  <a:lumMod val="40000"/>
-                  <a:lumOff val="60000"/>
-                </a:schemeClr>
-              </a:solidFill>
-              <a:ln w="19050">
-                <a:solidFill>
-                  <a:schemeClr val="tx1"/>
-                </a:solidFill>
-              </a:ln>
-            </p:spPr>
-            <p:style>
-              <a:lnRef idx="2">
-                <a:schemeClr val="accent1">
-                  <a:shade val="50000"/>
-                </a:schemeClr>
-              </a:lnRef>
-              <a:fillRef idx="1">
-                <a:schemeClr val="accent1"/>
-              </a:fillRef>
-              <a:effectRef idx="0">
-                <a:schemeClr val="accent1"/>
-              </a:effectRef>
-              <a:fontRef idx="minor">
-                <a:schemeClr val="lt1"/>
-              </a:fontRef>
-            </p:style>
-            <p:txBody>
-              <a:bodyPr rtlCol="0" anchor="ctr"/>
-              <a:lstStyle/>
-              <a:p>
-                <a:pPr algn="ctr"/>
-                <a14:m>
-                  <m:oMathPara xmlns:m="http://schemas.openxmlformats.org/officeDocument/2006/math">
-                    <m:oMathParaPr>
-                      <m:jc m:val="center"/>
-                    </m:oMathParaPr>
-                    <m:oMath xmlns:m="http://schemas.openxmlformats.org/officeDocument/2006/math">
-                      <m:sSub>
-                        <m:sSubPr>
-                          <m:ctrlPr>
-                            <a:rPr lang="en-US" sz="1000" i="1" smtClean="0">
-                              <a:solidFill>
-                                <a:schemeClr val="tx1"/>
-                              </a:solidFill>
-                              <a:latin typeface="Cambria Math" panose="02040503050406030204" pitchFamily="18" charset="0"/>
-                            </a:rPr>
-                          </m:ctrlPr>
-                        </m:sSubPr>
-                        <m:e>
-                          <m:r>
-                            <a:rPr lang="en-US" sz="1000" i="1">
-                              <a:solidFill>
-                                <a:schemeClr val="tx1"/>
-                              </a:solidFill>
-                              <a:latin typeface="Cambria Math" panose="02040503050406030204" pitchFamily="18" charset="0"/>
-                            </a:rPr>
-                            <m:t>𝑎</m:t>
-                          </m:r>
-                        </m:e>
-                        <m:sub>
-                          <m:r>
-                            <a:rPr lang="en-US" sz="1000" b="0" i="1" smtClean="0">
-                              <a:solidFill>
-                                <a:schemeClr val="tx1"/>
-                              </a:solidFill>
-                              <a:latin typeface="Cambria Math" panose="02040503050406030204" pitchFamily="18" charset="0"/>
-                            </a:rPr>
-                            <m:t>3</m:t>
-                          </m:r>
-                        </m:sub>
-                      </m:sSub>
-                    </m:oMath>
-                  </m:oMathPara>
-                </a14:m>
-                <a:endParaRPr lang="en-CH" sz="1000" dirty="0">
-                  <a:solidFill>
-                    <a:schemeClr val="tx1"/>
-                  </a:solidFill>
-                </a:endParaRPr>
-              </a:p>
-            </p:txBody>
-          </p:sp>
-        </mc:Choice>
-        <mc:Fallback xmlns="">
-          <p:sp>
-            <p:nvSpPr>
-              <p:cNvPr id="74" name="Oval 73">
-                <a:extLst>
-                  <a:ext uri="{FF2B5EF4-FFF2-40B4-BE49-F238E27FC236}">
-                    <a16:creationId xmlns:a16="http://schemas.microsoft.com/office/drawing/2014/main" id="{59F0C921-4DDA-CE3F-6775-97CBAB3B83EF}"/>
-                  </a:ext>
-                </a:extLst>
-              </p:cNvPr>
-              <p:cNvSpPr>
-                <a:spLocks noRot="1" noChangeAspect="1" noMove="1" noResize="1" noEditPoints="1" noAdjustHandles="1" noChangeArrowheads="1" noChangeShapeType="1" noTextEdit="1"/>
-              </p:cNvSpPr>
-              <p:nvPr/>
-            </p:nvSpPr>
-            <p:spPr>
-              <a:xfrm>
-                <a:off x="2556389" y="2894483"/>
-                <a:ext cx="316871" cy="316871"/>
-              </a:xfrm>
-              <a:prstGeom prst="ellipse">
-                <a:avLst/>
-              </a:prstGeom>
-              <a:blipFill>
-                <a:blip r:embed="rId9"/>
-                <a:stretch>
-                  <a:fillRect/>
-                </a:stretch>
-              </a:blipFill>
-              <a:ln w="19050">
-                <a:solidFill>
-                  <a:schemeClr val="tx1"/>
-                </a:solidFill>
-              </a:ln>
-            </p:spPr>
-            <p:txBody>
-              <a:bodyPr/>
-              <a:lstStyle/>
-              <a:p>
-                <a:r>
-                  <a:rPr lang="en-CH">
-                    <a:noFill/>
-                  </a:rPr>
-                  <a:t> </a:t>
-                </a:r>
-              </a:p>
-            </p:txBody>
-          </p:sp>
-        </mc:Fallback>
-      </mc:AlternateContent>
       <mc:AlternateContent xmlns:mc="http://schemas.openxmlformats.org/markup-compatibility/2006" xmlns:a14="http://schemas.microsoft.com/office/drawing/2010/main">
         <mc:Choice Requires="a14">
           <p:sp>
@@ -4567,8 +4668,8 @@
           </p:sp>
         </mc:Fallback>
       </mc:AlternateContent>
-      <mc:AlternateContent xmlns:mc="http://schemas.openxmlformats.org/markup-compatibility/2006" xmlns:a14="http://schemas.microsoft.com/office/drawing/2010/main">
-        <mc:Choice Requires="a14">
+      <mc:AlternateContent xmlns:mc="http://schemas.openxmlformats.org/markup-compatibility/2006">
+        <mc:Choice xmlns:a14="http://schemas.microsoft.com/office/drawing/2010/main" Requires="a14">
           <p:sp>
             <p:nvSpPr>
               <p:cNvPr id="77" name="Oval 76">
@@ -4658,7 +4759,7 @@
                               </a:solidFill>
                               <a:latin typeface="Cambria Math" panose="02040503050406030204" pitchFamily="18" charset="0"/>
                             </a:rPr>
-                            <m:t>4</m:t>
+                            <m:t>2</m:t>
                           </m:r>
                         </m:sub>
                       </m:sSub>
@@ -4674,7 +4775,7 @@
             </p:txBody>
           </p:sp>
         </mc:Choice>
-        <mc:Fallback xmlns="">
+        <mc:Fallback>
           <p:sp>
             <p:nvSpPr>
               <p:cNvPr id="77" name="Oval 76">
@@ -5064,8 +5165,8 @@
           </a:fontRef>
         </p:style>
       </p:cxnSp>
-      <mc:AlternateContent xmlns:mc="http://schemas.openxmlformats.org/markup-compatibility/2006" xmlns:a14="http://schemas.microsoft.com/office/drawing/2010/main">
-        <mc:Choice Requires="a14">
+      <mc:AlternateContent xmlns:mc="http://schemas.openxmlformats.org/markup-compatibility/2006">
+        <mc:Choice xmlns:a14="http://schemas.microsoft.com/office/drawing/2010/main" Requires="a14">
           <p:sp>
             <p:nvSpPr>
               <p:cNvPr id="93" name="Oval 92">
@@ -5155,7 +5256,7 @@
                               </a:solidFill>
                               <a:latin typeface="Cambria Math" panose="02040503050406030204" pitchFamily="18" charset="0"/>
                             </a:rPr>
-                            <m:t>5</m:t>
+                            <m:t>3</m:t>
                           </m:r>
                         </m:sub>
                       </m:sSub>
@@ -5171,7 +5272,7 @@
             </p:txBody>
           </p:sp>
         </mc:Choice>
-        <mc:Fallback xmlns="">
+        <mc:Fallback>
           <p:sp>
             <p:nvSpPr>
               <p:cNvPr id="93" name="Oval 92">
@@ -6113,7 +6214,7 @@
           <a:p>
             <a:r>
               <a:rPr lang="en-CH" sz="1000" dirty="0"/>
-              <a:t>Indirect effect</a:t>
+              <a:t>Effect on mediator</a:t>
             </a:r>
           </a:p>
         </p:txBody>
@@ -6148,13 +6249,13 @@
           <a:p>
             <a:r>
               <a:rPr lang="en-CH" sz="1000" dirty="0"/>
-              <a:t>Direct effect</a:t>
+              <a:t>Effect on outcome</a:t>
             </a:r>
           </a:p>
         </p:txBody>
       </p:sp>
-      <mc:AlternateContent xmlns:mc="http://schemas.openxmlformats.org/markup-compatibility/2006" xmlns:a14="http://schemas.microsoft.com/office/drawing/2010/main">
-        <mc:Choice Requires="a14">
+      <mc:AlternateContent xmlns:mc="http://schemas.openxmlformats.org/markup-compatibility/2006">
+        <mc:Choice xmlns:a14="http://schemas.microsoft.com/office/drawing/2010/main" Requires="a14">
           <p:sp>
             <p:nvSpPr>
               <p:cNvPr id="133" name="Oval 132">
@@ -6169,7 +6270,7 @@
             </p:nvSpPr>
             <p:spPr>
               <a:xfrm>
-                <a:off x="1935586" y="6223555"/>
+                <a:off x="1350446" y="6146901"/>
                 <a:ext cx="316871" cy="316871"/>
               </a:xfrm>
               <a:prstGeom prst="ellipse">
@@ -6260,7 +6361,7 @@
             </p:txBody>
           </p:sp>
         </mc:Choice>
-        <mc:Fallback xmlns="">
+        <mc:Fallback>
           <p:sp>
             <p:nvSpPr>
               <p:cNvPr id="133" name="Oval 132">
@@ -6277,7 +6378,7 @@
             </p:nvSpPr>
             <p:spPr>
               <a:xfrm>
-                <a:off x="1935586" y="6223555"/>
+                <a:off x="1350446" y="6146901"/>
                 <a:ext cx="316871" cy="316871"/>
               </a:xfrm>
               <a:prstGeom prst="ellipse">
@@ -6467,8 +6568,8 @@
           </p:sp>
         </mc:Fallback>
       </mc:AlternateContent>
-      <mc:AlternateContent xmlns:mc="http://schemas.openxmlformats.org/markup-compatibility/2006" xmlns:a14="http://schemas.microsoft.com/office/drawing/2010/main">
-        <mc:Choice Requires="a14">
+      <mc:AlternateContent xmlns:mc="http://schemas.openxmlformats.org/markup-compatibility/2006">
+        <mc:Choice xmlns:a14="http://schemas.microsoft.com/office/drawing/2010/main" Requires="a14">
           <p:sp>
             <p:nvSpPr>
               <p:cNvPr id="157" name="Rounded Rectangle 156">
@@ -6546,7 +6647,7 @@
             </p:txBody>
           </p:sp>
         </mc:Choice>
-        <mc:Fallback xmlns="">
+        <mc:Fallback>
           <p:sp>
             <p:nvSpPr>
               <p:cNvPr id="157" name="Rounded Rectangle 156">
@@ -6598,8 +6699,8 @@
           </p:sp>
         </mc:Fallback>
       </mc:AlternateContent>
-      <mc:AlternateContent xmlns:mc="http://schemas.openxmlformats.org/markup-compatibility/2006" xmlns:a14="http://schemas.microsoft.com/office/drawing/2010/main">
-        <mc:Choice Requires="a14">
+      <mc:AlternateContent xmlns:mc="http://schemas.openxmlformats.org/markup-compatibility/2006">
+        <mc:Choice xmlns:a14="http://schemas.microsoft.com/office/drawing/2010/main" Requires="a14">
           <p:sp>
             <p:nvSpPr>
               <p:cNvPr id="158" name="Rounded Rectangle 157">
@@ -6614,7 +6715,7 @@
             </p:nvSpPr>
             <p:spPr>
               <a:xfrm>
-                <a:off x="98540" y="4310871"/>
+                <a:off x="720511" y="4335072"/>
                 <a:ext cx="1032818" cy="691194"/>
               </a:xfrm>
               <a:prstGeom prst="roundRect">
@@ -6657,35 +6758,16 @@
                 <a:pPr algn="ctr"/>
                 <a:r>
                   <a:rPr lang="en-CH" sz="1000" dirty="0"/>
-                  <a:t>Prop. of diagnosed TB patients (</a:t>
+                  <a:t>Person-time of infectious TB patients (</a:t>
                 </a:r>
                 <a14:m>
                   <m:oMath xmlns:m="http://schemas.openxmlformats.org/officeDocument/2006/math">
-                    <m:sSub>
-                      <m:sSubPr>
-                        <m:ctrlPr>
-                          <a:rPr lang="en-US" sz="1000" b="0" i="1" dirty="0" smtClean="0">
-                            <a:latin typeface="Cambria Math" panose="02040503050406030204" pitchFamily="18" charset="0"/>
-                          </a:rPr>
-                        </m:ctrlPr>
-                      </m:sSubPr>
-                      <m:e>
-                        <m:r>
-                          <a:rPr lang="en-US" sz="1000" b="0" i="1" dirty="0" smtClean="0">
-                            <a:latin typeface="Cambria Math" panose="02040503050406030204" pitchFamily="18" charset="0"/>
-                          </a:rPr>
-                          <m:t>𝑃</m:t>
-                        </m:r>
-                      </m:e>
-                      <m:sub>
-                        <m:r>
-                          <a:rPr lang="en-US" sz="1000" b="0" i="1" dirty="0" smtClean="0">
-                            <a:latin typeface="Cambria Math" panose="02040503050406030204" pitchFamily="18" charset="0"/>
-                          </a:rPr>
-                          <m:t>𝐷</m:t>
-                        </m:r>
-                      </m:sub>
-                    </m:sSub>
+                    <m:r>
+                      <a:rPr lang="en-US" sz="1000" b="0" i="1" dirty="0" smtClean="0">
+                        <a:latin typeface="Cambria Math" panose="02040503050406030204" pitchFamily="18" charset="0"/>
+                      </a:rPr>
+                      <m:t>𝐼𝑃𝑇</m:t>
+                    </m:r>
                   </m:oMath>
                 </a14:m>
                 <a:r>
@@ -6696,7 +6778,7 @@
             </p:txBody>
           </p:sp>
         </mc:Choice>
-        <mc:Fallback xmlns="">
+        <mc:Fallback>
           <p:sp>
             <p:nvSpPr>
               <p:cNvPr id="158" name="Rounded Rectangle 157">
@@ -6713,7 +6795,7 @@
             </p:nvSpPr>
             <p:spPr>
               <a:xfrm>
-                <a:off x="98540" y="4310871"/>
+                <a:off x="720511" y="4335072"/>
                 <a:ext cx="1032818" cy="691194"/>
               </a:xfrm>
               <a:prstGeom prst="roundRect">
@@ -6724,174 +6806,6 @@
               <a:blipFill>
                 <a:blip r:embed="rId21"/>
                 <a:stretch>
-                  <a:fillRect/>
-                </a:stretch>
-              </a:blipFill>
-              <a:ln w="19050">
-                <a:solidFill>
-                  <a:schemeClr val="tx1"/>
-                </a:solidFill>
-              </a:ln>
-            </p:spPr>
-            <p:txBody>
-              <a:bodyPr/>
-              <a:lstStyle/>
-              <a:p>
-                <a:r>
-                  <a:rPr lang="en-CH">
-                    <a:noFill/>
-                  </a:rPr>
-                  <a:t> </a:t>
-                </a:r>
-              </a:p>
-            </p:txBody>
-          </p:sp>
-        </mc:Fallback>
-      </mc:AlternateContent>
-      <mc:AlternateContent xmlns:mc="http://schemas.openxmlformats.org/markup-compatibility/2006" xmlns:a14="http://schemas.microsoft.com/office/drawing/2010/main">
-        <mc:Choice Requires="a14">
-          <p:sp>
-            <p:nvSpPr>
-              <p:cNvPr id="162" name="Rounded Rectangle 161">
-                <a:extLst>
-                  <a:ext uri="{FF2B5EF4-FFF2-40B4-BE49-F238E27FC236}">
-                    <a16:creationId xmlns:a16="http://schemas.microsoft.com/office/drawing/2014/main" id="{997DAA9A-5CF0-CC0F-16DA-2AAE07DE4129}"/>
-                  </a:ext>
-                </a:extLst>
-              </p:cNvPr>
-              <p:cNvSpPr/>
-              <p:nvPr/>
-            </p:nvSpPr>
-            <p:spPr>
-              <a:xfrm>
-                <a:off x="1259090" y="4328991"/>
-                <a:ext cx="1032818" cy="691194"/>
-              </a:xfrm>
-              <a:prstGeom prst="roundRect">
-                <a:avLst>
-                  <a:gd name="adj" fmla="val 38506"/>
-                </a:avLst>
-              </a:prstGeom>
-              <a:solidFill>
-                <a:schemeClr val="accent2">
-                  <a:lumMod val="60000"/>
-                  <a:lumOff val="40000"/>
-                </a:schemeClr>
-              </a:solidFill>
-              <a:ln w="19050">
-                <a:solidFill>
-                  <a:schemeClr val="tx1"/>
-                </a:solidFill>
-                <a:prstDash val="solid"/>
-              </a:ln>
-            </p:spPr>
-            <p:style>
-              <a:lnRef idx="2">
-                <a:schemeClr val="accent1">
-                  <a:shade val="50000"/>
-                </a:schemeClr>
-              </a:lnRef>
-              <a:fillRef idx="1">
-                <a:schemeClr val="accent1"/>
-              </a:fillRef>
-              <a:effectRef idx="0">
-                <a:schemeClr val="accent1"/>
-              </a:effectRef>
-              <a:fontRef idx="minor">
-                <a:schemeClr val="lt1"/>
-              </a:fontRef>
-            </p:style>
-            <p:txBody>
-              <a:bodyPr rtlCol="0" anchor="ctr"/>
-              <a:lstStyle/>
-              <a:p>
-                <a:pPr algn="ctr"/>
-                <a:r>
-                  <a:rPr lang="en-CH" sz="1000" dirty="0">
-                    <a:solidFill>
-                      <a:sysClr val="windowText" lastClr="000000"/>
-                    </a:solidFill>
-                  </a:rPr>
-                  <a:t>Prop. of undiagnosed TB patients (</a:t>
-                </a:r>
-                <a14:m>
-                  <m:oMath xmlns:m="http://schemas.openxmlformats.org/officeDocument/2006/math">
-                    <m:sSub>
-                      <m:sSubPr>
-                        <m:ctrlPr>
-                          <a:rPr lang="en-US" sz="1000" b="0" i="1" dirty="0" smtClean="0">
-                            <a:solidFill>
-                              <a:sysClr val="windowText" lastClr="000000"/>
-                            </a:solidFill>
-                            <a:latin typeface="Cambria Math" panose="02040503050406030204" pitchFamily="18" charset="0"/>
-                          </a:rPr>
-                        </m:ctrlPr>
-                      </m:sSubPr>
-                      <m:e>
-                        <m:r>
-                          <a:rPr lang="en-US" sz="1000" b="0" i="1" dirty="0" smtClean="0">
-                            <a:solidFill>
-                              <a:sysClr val="windowText" lastClr="000000"/>
-                            </a:solidFill>
-                            <a:latin typeface="Cambria Math" panose="02040503050406030204" pitchFamily="18" charset="0"/>
-                          </a:rPr>
-                          <m:t>𝑃</m:t>
-                        </m:r>
-                      </m:e>
-                      <m:sub>
-                        <m:r>
-                          <a:rPr lang="en-US" sz="1000" b="0" i="1" dirty="0" smtClean="0">
-                            <a:solidFill>
-                              <a:sysClr val="windowText" lastClr="000000"/>
-                            </a:solidFill>
-                            <a:latin typeface="Cambria Math" panose="02040503050406030204" pitchFamily="18" charset="0"/>
-                          </a:rPr>
-                          <m:t>𝑈</m:t>
-                        </m:r>
-                      </m:sub>
-                    </m:sSub>
-                  </m:oMath>
-                </a14:m>
-                <a:r>
-                  <a:rPr lang="en-CH" sz="1000" dirty="0">
-                    <a:solidFill>
-                      <a:sysClr val="windowText" lastClr="000000"/>
-                    </a:solidFill>
-                  </a:rPr>
-                  <a:t>)</a:t>
-                </a:r>
-              </a:p>
-            </p:txBody>
-          </p:sp>
-        </mc:Choice>
-        <mc:Fallback xmlns="">
-          <p:sp>
-            <p:nvSpPr>
-              <p:cNvPr id="162" name="Rounded Rectangle 161">
-                <a:extLst>
-                  <a:ext uri="{FF2B5EF4-FFF2-40B4-BE49-F238E27FC236}">
-                    <a16:creationId xmlns:a16="http://schemas.microsoft.com/office/drawing/2014/main" id="{997DAA9A-5CF0-CC0F-16DA-2AAE07DE4129}"/>
-                  </a:ext>
-                </a:extLst>
-              </p:cNvPr>
-              <p:cNvSpPr>
-                <a:spLocks noRot="1" noChangeAspect="1" noMove="1" noResize="1" noEditPoints="1" noAdjustHandles="1" noChangeArrowheads="1" noChangeShapeType="1" noTextEdit="1"/>
-              </p:cNvSpPr>
-              <p:nvPr/>
-            </p:nvSpPr>
-            <p:spPr>
-              <a:xfrm>
-                <a:off x="1259090" y="4328991"/>
-                <a:ext cx="1032818" cy="691194"/>
-              </a:xfrm>
-              <a:prstGeom prst="roundRect">
-                <a:avLst>
-                  <a:gd name="adj" fmla="val 38506"/>
-                </a:avLst>
-              </a:prstGeom>
-              <a:blipFill>
-                <a:blip r:embed="rId22"/>
-                <a:stretch>
                   <a:fillRect b="-3509"/>
                 </a:stretch>
               </a:blipFill>
@@ -6899,7 +6813,6 @@
                 <a:solidFill>
                   <a:schemeClr val="tx1"/>
                 </a:solidFill>
-                <a:prstDash val="solid"/>
               </a:ln>
             </p:spPr>
             <p:txBody>
@@ -6936,7 +6849,7 @@
         <p:spPr>
           <a:xfrm>
             <a:off x="614949" y="3647261"/>
-            <a:ext cx="0" cy="663610"/>
+            <a:ext cx="621971" cy="687811"/>
           </a:xfrm>
           <a:prstGeom prst="straightConnector1">
             <a:avLst/>
@@ -7127,52 +7040,6 @@
           <a:xfrm flipH="1">
             <a:off x="3130531" y="2452012"/>
             <a:ext cx="6169" cy="3804078"/>
-          </a:xfrm>
-          <a:prstGeom prst="straightConnector1">
-            <a:avLst/>
-          </a:prstGeom>
-          <a:ln w="19050">
-            <a:solidFill>
-              <a:schemeClr val="tx1"/>
-            </a:solidFill>
-            <a:tailEnd type="triangle"/>
-          </a:ln>
-        </p:spPr>
-        <p:style>
-          <a:lnRef idx="1">
-            <a:schemeClr val="accent1"/>
-          </a:lnRef>
-          <a:fillRef idx="0">
-            <a:schemeClr val="accent1"/>
-          </a:fillRef>
-          <a:effectRef idx="0">
-            <a:schemeClr val="accent1"/>
-          </a:effectRef>
-          <a:fontRef idx="minor">
-            <a:schemeClr val="tx1"/>
-          </a:fontRef>
-        </p:style>
-      </p:cxnSp>
-      <p:cxnSp>
-        <p:nvCxnSpPr>
-          <p:cNvPr id="225" name="Straight Arrow Connector 224">
-            <a:extLst>
-              <a:ext uri="{FF2B5EF4-FFF2-40B4-BE49-F238E27FC236}">
-                <a16:creationId xmlns:a16="http://schemas.microsoft.com/office/drawing/2014/main" id="{60A37A3D-1279-FD8E-B4B2-2E45DF608805}"/>
-              </a:ext>
-            </a:extLst>
-          </p:cNvPr>
-          <p:cNvCxnSpPr>
-            <a:cxnSpLocks/>
-            <a:stCxn id="13" idx="3"/>
-            <a:endCxn id="4" idx="1"/>
-          </p:cNvCxnSpPr>
-          <p:nvPr/>
-        </p:nvCxnSpPr>
-        <p:spPr>
-          <a:xfrm>
-            <a:off x="1665912" y="6601687"/>
-            <a:ext cx="948210" cy="0"/>
           </a:xfrm>
           <a:prstGeom prst="straightConnector1">
             <a:avLst/>
@@ -7382,165 +7249,6 @@
           </a:fontRef>
         </p:style>
       </p:cxnSp>
-      <mc:AlternateContent xmlns:mc="http://schemas.openxmlformats.org/markup-compatibility/2006" xmlns:a14="http://schemas.microsoft.com/office/drawing/2010/main">
-        <mc:Choice Requires="a14">
-          <p:sp>
-            <p:nvSpPr>
-              <p:cNvPr id="253" name="Oval 252">
-                <a:extLst>
-                  <a:ext uri="{FF2B5EF4-FFF2-40B4-BE49-F238E27FC236}">
-                    <a16:creationId xmlns:a16="http://schemas.microsoft.com/office/drawing/2014/main" id="{C25080BB-C1C7-788C-D4BA-A851CA7326B8}"/>
-                  </a:ext>
-                </a:extLst>
-              </p:cNvPr>
-              <p:cNvSpPr/>
-              <p:nvPr/>
-            </p:nvSpPr>
-            <p:spPr>
-              <a:xfrm>
-                <a:off x="2390743" y="4593317"/>
-                <a:ext cx="316871" cy="316871"/>
-              </a:xfrm>
-              <a:prstGeom prst="ellipse">
-                <a:avLst/>
-              </a:prstGeom>
-              <a:solidFill>
-                <a:schemeClr val="accent6">
-                  <a:lumMod val="40000"/>
-                  <a:lumOff val="60000"/>
-                </a:schemeClr>
-              </a:solidFill>
-              <a:ln w="19050">
-                <a:solidFill>
-                  <a:schemeClr val="tx1"/>
-                </a:solidFill>
-                <a:prstDash val="solid"/>
-              </a:ln>
-            </p:spPr>
-            <p:style>
-              <a:lnRef idx="2">
-                <a:schemeClr val="accent1">
-                  <a:shade val="50000"/>
-                </a:schemeClr>
-              </a:lnRef>
-              <a:fillRef idx="1">
-                <a:schemeClr val="accent1"/>
-              </a:fillRef>
-              <a:effectRef idx="0">
-                <a:schemeClr val="accent1"/>
-              </a:effectRef>
-              <a:fontRef idx="minor">
-                <a:schemeClr val="lt1"/>
-              </a:fontRef>
-            </p:style>
-            <p:txBody>
-              <a:bodyPr rtlCol="0" anchor="ctr"/>
-              <a:lstStyle/>
-              <a:p>
-                <a:pPr algn="ctr"/>
-                <a14:m>
-                  <m:oMathPara xmlns:m="http://schemas.openxmlformats.org/officeDocument/2006/math">
-                    <m:oMathParaPr>
-                      <m:jc m:val="center"/>
-                    </m:oMathParaPr>
-                    <m:oMath xmlns:m="http://schemas.openxmlformats.org/officeDocument/2006/math">
-                      <m:sSub>
-                        <m:sSubPr>
-                          <m:ctrlPr>
-                            <a:rPr lang="en-US" sz="1000" i="1" smtClean="0">
-                              <a:solidFill>
-                                <a:schemeClr val="tx1"/>
-                              </a:solidFill>
-                              <a:latin typeface="Cambria Math" panose="02040503050406030204" pitchFamily="18" charset="0"/>
-                            </a:rPr>
-                          </m:ctrlPr>
-                        </m:sSubPr>
-                        <m:e>
-                          <m:r>
-                            <a:rPr lang="de-CH" sz="1000" b="0" i="1" smtClean="0">
-                              <a:solidFill>
-                                <a:schemeClr val="tx1"/>
-                              </a:solidFill>
-                              <a:latin typeface="Cambria Math" panose="02040503050406030204" pitchFamily="18" charset="0"/>
-                            </a:rPr>
-                            <m:t>𝑎</m:t>
-                          </m:r>
-                        </m:e>
-                        <m:sub>
-                          <m:r>
-                            <a:rPr lang="en-US" sz="1000" b="0" i="1" smtClean="0">
-                              <a:solidFill>
-                                <a:schemeClr val="tx1"/>
-                              </a:solidFill>
-                              <a:latin typeface="Cambria Math" panose="02040503050406030204" pitchFamily="18" charset="0"/>
-                            </a:rPr>
-                            <m:t>2</m:t>
-                          </m:r>
-                        </m:sub>
-                      </m:sSub>
-                    </m:oMath>
-                  </m:oMathPara>
-                </a14:m>
-                <a:endParaRPr lang="en-CH" sz="1000" dirty="0">
-                  <a:solidFill>
-                    <a:schemeClr val="tx1"/>
-                  </a:solidFill>
-                </a:endParaRPr>
-              </a:p>
-            </p:txBody>
-          </p:sp>
-        </mc:Choice>
-        <mc:Fallback xmlns="">
-          <p:sp>
-            <p:nvSpPr>
-              <p:cNvPr id="253" name="Oval 252">
-                <a:extLst>
-                  <a:ext uri="{FF2B5EF4-FFF2-40B4-BE49-F238E27FC236}">
-                    <a16:creationId xmlns:a16="http://schemas.microsoft.com/office/drawing/2014/main" id="{C25080BB-C1C7-788C-D4BA-A851CA7326B8}"/>
-                  </a:ext>
-                </a:extLst>
-              </p:cNvPr>
-              <p:cNvSpPr>
-                <a:spLocks noRot="1" noChangeAspect="1" noMove="1" noResize="1" noEditPoints="1" noAdjustHandles="1" noChangeArrowheads="1" noChangeShapeType="1" noTextEdit="1"/>
-              </p:cNvSpPr>
-              <p:nvPr/>
-            </p:nvSpPr>
-            <p:spPr>
-              <a:xfrm>
-                <a:off x="2390743" y="4593317"/>
-                <a:ext cx="316871" cy="316871"/>
-              </a:xfrm>
-              <a:prstGeom prst="ellipse">
-                <a:avLst/>
-              </a:prstGeom>
-              <a:blipFill>
-                <a:blip r:embed="rId23"/>
-                <a:stretch>
-                  <a:fillRect/>
-                </a:stretch>
-              </a:blipFill>
-              <a:ln w="19050">
-                <a:solidFill>
-                  <a:schemeClr val="tx1"/>
-                </a:solidFill>
-                <a:prstDash val="solid"/>
-              </a:ln>
-            </p:spPr>
-            <p:txBody>
-              <a:bodyPr/>
-              <a:lstStyle/>
-              <a:p>
-                <a:r>
-                  <a:rPr lang="en-CH">
-                    <a:noFill/>
-                  </a:rPr>
-                  <a:t> </a:t>
-                </a:r>
-              </a:p>
-            </p:txBody>
-          </p:sp>
-        </mc:Fallback>
-      </mc:AlternateContent>
       <p:sp>
         <p:nvSpPr>
           <p:cNvPr id="259" name="Rounded Rectangle 258">
@@ -7603,7 +7311,7 @@
                   <a:sysClr val="windowText" lastClr="000000"/>
                 </a:solidFill>
               </a:rPr>
-              <a:t>General pandemic restrictions</a:t>
+              <a:t>Pandemic situation</a:t>
             </a:r>
             <a:endParaRPr lang="en-CH" sz="1000" dirty="0">
               <a:solidFill>
@@ -7716,15 +7424,14 @@
           </p:cNvPr>
           <p:cNvCxnSpPr>
             <a:cxnSpLocks/>
-            <a:stCxn id="158" idx="2"/>
-            <a:endCxn id="13" idx="0"/>
+            <a:endCxn id="4" idx="1"/>
           </p:cNvCxnSpPr>
           <p:nvPr/>
         </p:nvCxnSpPr>
         <p:spPr>
           <a:xfrm>
-            <a:off x="614949" y="5002065"/>
-            <a:ext cx="534554" cy="1254025"/>
+            <a:off x="1236920" y="6601687"/>
+            <a:ext cx="1377202" cy="0"/>
           </a:xfrm>
           <a:prstGeom prst="straightConnector1">
             <a:avLst/>
@@ -7762,15 +7469,15 @@
           </p:cNvPr>
           <p:cNvCxnSpPr>
             <a:cxnSpLocks/>
-            <a:stCxn id="162" idx="2"/>
-            <a:endCxn id="13" idx="0"/>
+            <a:stCxn id="11" idx="2"/>
+            <a:endCxn id="158" idx="0"/>
           </p:cNvCxnSpPr>
           <p:nvPr/>
         </p:nvCxnSpPr>
         <p:spPr>
           <a:xfrm flipH="1">
-            <a:off x="1149503" y="5020185"/>
-            <a:ext cx="625996" cy="1235905"/>
+            <a:off x="1236920" y="3648433"/>
+            <a:ext cx="642043" cy="686639"/>
           </a:xfrm>
           <a:prstGeom prst="straightConnector1">
             <a:avLst/>
@@ -7797,52 +7504,6 @@
           </a:fontRef>
         </p:style>
       </p:cxnSp>
-      <p:cxnSp>
-        <p:nvCxnSpPr>
-          <p:cNvPr id="323" name="Straight Arrow Connector 322">
-            <a:extLst>
-              <a:ext uri="{FF2B5EF4-FFF2-40B4-BE49-F238E27FC236}">
-                <a16:creationId xmlns:a16="http://schemas.microsoft.com/office/drawing/2014/main" id="{4F66361B-874E-B006-B3B1-4F88A1693883}"/>
-              </a:ext>
-            </a:extLst>
-          </p:cNvPr>
-          <p:cNvCxnSpPr>
-            <a:cxnSpLocks/>
-            <a:stCxn id="157" idx="2"/>
-            <a:endCxn id="162" idx="0"/>
-          </p:cNvCxnSpPr>
-          <p:nvPr/>
-        </p:nvCxnSpPr>
-        <p:spPr>
-          <a:xfrm>
-            <a:off x="614949" y="3647261"/>
-            <a:ext cx="1160550" cy="681730"/>
-          </a:xfrm>
-          <a:prstGeom prst="straightConnector1">
-            <a:avLst/>
-          </a:prstGeom>
-          <a:ln w="19050">
-            <a:solidFill>
-              <a:schemeClr val="tx1"/>
-            </a:solidFill>
-            <a:tailEnd type="triangle"/>
-          </a:ln>
-        </p:spPr>
-        <p:style>
-          <a:lnRef idx="1">
-            <a:schemeClr val="accent1"/>
-          </a:lnRef>
-          <a:fillRef idx="0">
-            <a:schemeClr val="accent1"/>
-          </a:fillRef>
-          <a:effectRef idx="0">
-            <a:schemeClr val="accent1"/>
-          </a:effectRef>
-          <a:fontRef idx="minor">
-            <a:schemeClr val="tx1"/>
-          </a:fontRef>
-        </p:style>
-      </p:cxnSp>
       <p:sp>
         <p:nvSpPr>
           <p:cNvPr id="328" name="Rounded Rectangle 327">
@@ -7857,7 +7518,7 @@
         </p:nvSpPr>
         <p:spPr>
           <a:xfrm>
-            <a:off x="1362554" y="1061316"/>
+            <a:off x="1273403" y="1073995"/>
             <a:ext cx="3726595" cy="489373"/>
           </a:xfrm>
           <a:prstGeom prst="roundRect">
@@ -7923,8 +7584,8 @@
         </p:nvCxnSpPr>
         <p:spPr>
           <a:xfrm rot="5400000">
-            <a:off x="2448029" y="982994"/>
-            <a:ext cx="210129" cy="1345519"/>
+            <a:off x="2409792" y="1033909"/>
+            <a:ext cx="197450" cy="1256368"/>
           </a:xfrm>
           <a:prstGeom prst="bentConnector3">
             <a:avLst/>
@@ -7968,8 +7629,8 @@
         </p:nvCxnSpPr>
         <p:spPr>
           <a:xfrm rot="5400000">
-            <a:off x="3076212" y="1611177"/>
-            <a:ext cx="210129" cy="89152"/>
+            <a:off x="3037976" y="1662093"/>
+            <a:ext cx="197450" cy="1"/>
           </a:xfrm>
           <a:prstGeom prst="bentConnector3">
             <a:avLst>
@@ -8015,8 +7676,8 @@
         </p:nvCxnSpPr>
         <p:spPr>
           <a:xfrm rot="16200000" flipH="1">
-            <a:off x="3795279" y="981262"/>
-            <a:ext cx="208034" cy="1346888"/>
+            <a:off x="3757043" y="943025"/>
+            <a:ext cx="195355" cy="1436039"/>
           </a:xfrm>
           <a:prstGeom prst="bentConnector3">
             <a:avLst>
@@ -8046,86 +7707,38 @@
       </p:cxnSp>
       <p:cxnSp>
         <p:nvCxnSpPr>
-          <p:cNvPr id="345" name="Straight Connector 344">
+          <p:cNvPr id="20" name="Straight Connector 19">
             <a:extLst>
               <a:ext uri="{FF2B5EF4-FFF2-40B4-BE49-F238E27FC236}">
-                <a16:creationId xmlns:a16="http://schemas.microsoft.com/office/drawing/2014/main" id="{C50A350D-A621-534F-57B0-CC5F296CBA83}"/>
+                <a16:creationId xmlns:a16="http://schemas.microsoft.com/office/drawing/2014/main" id="{EAA9F320-0CC5-341E-7A15-963985CB1554}"/>
               </a:ext>
             </a:extLst>
           </p:cNvPr>
           <p:cNvCxnSpPr>
-            <a:stCxn id="11" idx="2"/>
+            <a:cxnSpLocks/>
+            <a:stCxn id="158" idx="2"/>
           </p:cNvCxnSpPr>
           <p:nvPr/>
         </p:nvCxnSpPr>
         <p:spPr>
           <a:xfrm>
-            <a:off x="1878963" y="3648433"/>
-            <a:ext cx="994297" cy="1119587"/>
+            <a:off x="1236920" y="5026266"/>
+            <a:ext cx="0" cy="1573077"/>
           </a:xfrm>
           <a:prstGeom prst="line">
             <a:avLst/>
           </a:prstGeom>
-          <a:ln w="19050">
-            <a:solidFill>
-              <a:schemeClr val="tx1"/>
-            </a:solidFill>
-          </a:ln>
+          <a:ln w="19050"/>
         </p:spPr>
         <p:style>
           <a:lnRef idx="1">
-            <a:schemeClr val="accent1"/>
+            <a:schemeClr val="dk1"/>
           </a:lnRef>
           <a:fillRef idx="0">
-            <a:schemeClr val="accent1"/>
+            <a:schemeClr val="dk1"/>
           </a:fillRef>
           <a:effectRef idx="0">
-            <a:schemeClr val="accent1"/>
-          </a:effectRef>
-          <a:fontRef idx="minor">
-            <a:schemeClr val="tx1"/>
-          </a:fontRef>
-        </p:style>
-      </p:cxnSp>
-      <p:cxnSp>
-        <p:nvCxnSpPr>
-          <p:cNvPr id="347" name="Straight Arrow Connector 346">
-            <a:extLst>
-              <a:ext uri="{FF2B5EF4-FFF2-40B4-BE49-F238E27FC236}">
-                <a16:creationId xmlns:a16="http://schemas.microsoft.com/office/drawing/2014/main" id="{3B14E825-A0C1-695E-9919-9DEF1C754B1B}"/>
-              </a:ext>
-            </a:extLst>
-          </p:cNvPr>
-          <p:cNvCxnSpPr>
-            <a:cxnSpLocks/>
-            <a:endCxn id="13" idx="0"/>
-          </p:cNvCxnSpPr>
-          <p:nvPr/>
-        </p:nvCxnSpPr>
-        <p:spPr>
-          <a:xfrm flipH="1">
-            <a:off x="1149503" y="4768020"/>
-            <a:ext cx="1723757" cy="1488070"/>
-          </a:xfrm>
-          <a:prstGeom prst="straightConnector1">
-            <a:avLst/>
-          </a:prstGeom>
-          <a:ln w="19050">
-            <a:solidFill>
-              <a:schemeClr val="tx1"/>
-            </a:solidFill>
-            <a:tailEnd type="triangle"/>
-          </a:ln>
-        </p:spPr>
-        <p:style>
-          <a:lnRef idx="1">
-            <a:schemeClr val="accent1"/>
-          </a:lnRef>
-          <a:fillRef idx="0">
-            <a:schemeClr val="accent1"/>
-          </a:fillRef>
-          <a:effectRef idx="0">
-            <a:schemeClr val="accent1"/>
+            <a:schemeClr val="dk1"/>
           </a:effectRef>
           <a:fontRef idx="minor">
             <a:schemeClr val="tx1"/>
@@ -8404,4 +8017,319 @@
     </a:ext>
   </a:extLst>
 </a:theme>
+</file>
+
+<file path=ppt/theme/theme2.xml><?xml version="1.0" encoding="utf-8"?>
+<a:theme xmlns:a="http://schemas.openxmlformats.org/drawingml/2006/main" name="Office Theme">
+  <a:themeElements>
+    <a:clrScheme name="Office">
+      <a:dk1>
+        <a:sysClr val="windowText" lastClr="000000"/>
+      </a:dk1>
+      <a:lt1>
+        <a:sysClr val="window" lastClr="FFFFFF"/>
+      </a:lt1>
+      <a:dk2>
+        <a:srgbClr val="0E2841"/>
+      </a:dk2>
+      <a:lt2>
+        <a:srgbClr val="E8E8E8"/>
+      </a:lt2>
+      <a:accent1>
+        <a:srgbClr val="156082"/>
+      </a:accent1>
+      <a:accent2>
+        <a:srgbClr val="E97132"/>
+      </a:accent2>
+      <a:accent3>
+        <a:srgbClr val="196B24"/>
+      </a:accent3>
+      <a:accent4>
+        <a:srgbClr val="0F9ED5"/>
+      </a:accent4>
+      <a:accent5>
+        <a:srgbClr val="A02B93"/>
+      </a:accent5>
+      <a:accent6>
+        <a:srgbClr val="4EA72E"/>
+      </a:accent6>
+      <a:hlink>
+        <a:srgbClr val="467886"/>
+      </a:hlink>
+      <a:folHlink>
+        <a:srgbClr val="96607D"/>
+      </a:folHlink>
+    </a:clrScheme>
+    <a:fontScheme name="Office">
+      <a:majorFont>
+        <a:latin typeface="Aptos Display" panose="02110004020202020204"/>
+        <a:ea typeface=""/>
+        <a:cs typeface=""/>
+        <a:font script="Jpan" typeface="游ゴシック Light"/>
+        <a:font script="Hang" typeface="맑은 고딕"/>
+        <a:font script="Hans" typeface="等线 Light"/>
+        <a:font script="Hant" typeface="新細明體"/>
+        <a:font script="Arab" typeface="Times New Roman"/>
+        <a:font script="Hebr" typeface="Times New Roman"/>
+        <a:font script="Thai" typeface="Angsana New"/>
+        <a:font script="Ethi" typeface="Nyala"/>
+        <a:font script="Beng" typeface="Vrinda"/>
+        <a:font script="Gujr" typeface="Shruti"/>
+        <a:font script="Khmr" typeface="MoolBoran"/>
+        <a:font script="Knda" typeface="Tunga"/>
+        <a:font script="Guru" typeface="Raavi"/>
+        <a:font script="Cans" typeface="Euphemia"/>
+        <a:font script="Cher" typeface="Plantagenet Cherokee"/>
+        <a:font script="Yiii" typeface="Microsoft Yi Baiti"/>
+        <a:font script="Tibt" typeface="Microsoft Himalaya"/>
+        <a:font script="Thaa" typeface="MV Boli"/>
+        <a:font script="Deva" typeface="Mangal"/>
+        <a:font script="Telu" typeface="Gautami"/>
+        <a:font script="Taml" typeface="Latha"/>
+        <a:font script="Syrc" typeface="Estrangelo Edessa"/>
+        <a:font script="Orya" typeface="Kalinga"/>
+        <a:font script="Mlym" typeface="Kartika"/>
+        <a:font script="Laoo" typeface="DokChampa"/>
+        <a:font script="Sinh" typeface="Iskoola Pota"/>
+        <a:font script="Mong" typeface="Mongolian Baiti"/>
+        <a:font script="Viet" typeface="Times New Roman"/>
+        <a:font script="Uigh" typeface="Microsoft Uighur"/>
+        <a:font script="Geor" typeface="Sylfaen"/>
+        <a:font script="Armn" typeface="Arial"/>
+        <a:font script="Bugi" typeface="Leelawadee UI"/>
+        <a:font script="Bopo" typeface="Microsoft JhengHei"/>
+        <a:font script="Java" typeface="Javanese Text"/>
+        <a:font script="Lisu" typeface="Segoe UI"/>
+        <a:font script="Mymr" typeface="Myanmar Text"/>
+        <a:font script="Nkoo" typeface="Ebrima"/>
+        <a:font script="Olck" typeface="Nirmala UI"/>
+        <a:font script="Osma" typeface="Ebrima"/>
+        <a:font script="Phag" typeface="Phagspa"/>
+        <a:font script="Syrn" typeface="Estrangelo Edessa"/>
+        <a:font script="Syrj" typeface="Estrangelo Edessa"/>
+        <a:font script="Syre" typeface="Estrangelo Edessa"/>
+        <a:font script="Sora" typeface="Nirmala UI"/>
+        <a:font script="Tale" typeface="Microsoft Tai Le"/>
+        <a:font script="Talu" typeface="Microsoft New Tai Lue"/>
+        <a:font script="Tfng" typeface="Ebrima"/>
+      </a:majorFont>
+      <a:minorFont>
+        <a:latin typeface="Aptos" panose="02110004020202020204"/>
+        <a:ea typeface=""/>
+        <a:cs typeface=""/>
+        <a:font script="Jpan" typeface="游ゴシック"/>
+        <a:font script="Hang" typeface="맑은 고딕"/>
+        <a:font script="Hans" typeface="等线"/>
+        <a:font script="Hant" typeface="新細明體"/>
+        <a:font script="Arab" typeface="Arial"/>
+        <a:font script="Hebr" typeface="Arial"/>
+        <a:font script="Thai" typeface="Cordia New"/>
+        <a:font script="Ethi" typeface="Nyala"/>
+        <a:font script="Beng" typeface="Vrinda"/>
+        <a:font script="Gujr" typeface="Shruti"/>
+        <a:font script="Khmr" typeface="DaunPenh"/>
+        <a:font script="Knda" typeface="Tunga"/>
+        <a:font script="Guru" typeface="Raavi"/>
+        <a:font script="Cans" typeface="Euphemia"/>
+        <a:font script="Cher" typeface="Plantagenet Cherokee"/>
+        <a:font script="Yiii" typeface="Microsoft Yi Baiti"/>
+        <a:font script="Tibt" typeface="Microsoft Himalaya"/>
+        <a:font script="Thaa" typeface="MV Boli"/>
+        <a:font script="Deva" typeface="Mangal"/>
+        <a:font script="Telu" typeface="Gautami"/>
+        <a:font script="Taml" typeface="Latha"/>
+        <a:font script="Syrc" typeface="Estrangelo Edessa"/>
+        <a:font script="Orya" typeface="Kalinga"/>
+        <a:font script="Mlym" typeface="Kartika"/>
+        <a:font script="Laoo" typeface="DokChampa"/>
+        <a:font script="Sinh" typeface="Iskoola Pota"/>
+        <a:font script="Mong" typeface="Mongolian Baiti"/>
+        <a:font script="Viet" typeface="Arial"/>
+        <a:font script="Uigh" typeface="Microsoft Uighur"/>
+        <a:font script="Geor" typeface="Sylfaen"/>
+        <a:font script="Armn" typeface="Arial"/>
+        <a:font script="Bugi" typeface="Leelawadee UI"/>
+        <a:font script="Bopo" typeface="Microsoft JhengHei"/>
+        <a:font script="Java" typeface="Javanese Text"/>
+        <a:font script="Lisu" typeface="Segoe UI"/>
+        <a:font script="Mymr" typeface="Myanmar Text"/>
+        <a:font script="Nkoo" typeface="Ebrima"/>
+        <a:font script="Olck" typeface="Nirmala UI"/>
+        <a:font script="Osma" typeface="Ebrima"/>
+        <a:font script="Phag" typeface="Phagspa"/>
+        <a:font script="Syrn" typeface="Estrangelo Edessa"/>
+        <a:font script="Syrj" typeface="Estrangelo Edessa"/>
+        <a:font script="Syre" typeface="Estrangelo Edessa"/>
+        <a:font script="Sora" typeface="Nirmala UI"/>
+        <a:font script="Tale" typeface="Microsoft Tai Le"/>
+        <a:font script="Talu" typeface="Microsoft New Tai Lue"/>
+        <a:font script="Tfng" typeface="Ebrima"/>
+      </a:minorFont>
+    </a:fontScheme>
+    <a:fmtScheme name="Office">
+      <a:fillStyleLst>
+        <a:solidFill>
+          <a:schemeClr val="phClr"/>
+        </a:solidFill>
+        <a:gradFill rotWithShape="1">
+          <a:gsLst>
+            <a:gs pos="0">
+              <a:schemeClr val="phClr">
+                <a:lumMod val="110000"/>
+                <a:satMod val="105000"/>
+                <a:tint val="67000"/>
+              </a:schemeClr>
+            </a:gs>
+            <a:gs pos="50000">
+              <a:schemeClr val="phClr">
+                <a:lumMod val="105000"/>
+                <a:satMod val="103000"/>
+                <a:tint val="73000"/>
+              </a:schemeClr>
+            </a:gs>
+            <a:gs pos="100000">
+              <a:schemeClr val="phClr">
+                <a:lumMod val="105000"/>
+                <a:satMod val="109000"/>
+                <a:tint val="81000"/>
+              </a:schemeClr>
+            </a:gs>
+          </a:gsLst>
+          <a:lin ang="5400000" scaled="0"/>
+        </a:gradFill>
+        <a:gradFill rotWithShape="1">
+          <a:gsLst>
+            <a:gs pos="0">
+              <a:schemeClr val="phClr">
+                <a:satMod val="103000"/>
+                <a:lumMod val="102000"/>
+                <a:tint val="94000"/>
+              </a:schemeClr>
+            </a:gs>
+            <a:gs pos="50000">
+              <a:schemeClr val="phClr">
+                <a:satMod val="110000"/>
+                <a:lumMod val="100000"/>
+                <a:shade val="100000"/>
+              </a:schemeClr>
+            </a:gs>
+            <a:gs pos="100000">
+              <a:schemeClr val="phClr">
+                <a:lumMod val="99000"/>
+                <a:satMod val="120000"/>
+                <a:shade val="78000"/>
+              </a:schemeClr>
+            </a:gs>
+          </a:gsLst>
+          <a:lin ang="5400000" scaled="0"/>
+        </a:gradFill>
+      </a:fillStyleLst>
+      <a:lnStyleLst>
+        <a:ln w="12700" cap="flat" cmpd="sng" algn="ctr">
+          <a:solidFill>
+            <a:schemeClr val="phClr"/>
+          </a:solidFill>
+          <a:prstDash val="solid"/>
+          <a:miter lim="800000"/>
+        </a:ln>
+        <a:ln w="19050" cap="flat" cmpd="sng" algn="ctr">
+          <a:solidFill>
+            <a:schemeClr val="phClr"/>
+          </a:solidFill>
+          <a:prstDash val="solid"/>
+          <a:miter lim="800000"/>
+        </a:ln>
+        <a:ln w="25400" cap="flat" cmpd="sng" algn="ctr">
+          <a:solidFill>
+            <a:schemeClr val="phClr"/>
+          </a:solidFill>
+          <a:prstDash val="solid"/>
+          <a:miter lim="800000"/>
+        </a:ln>
+      </a:lnStyleLst>
+      <a:effectStyleLst>
+        <a:effectStyle>
+          <a:effectLst/>
+        </a:effectStyle>
+        <a:effectStyle>
+          <a:effectLst/>
+        </a:effectStyle>
+        <a:effectStyle>
+          <a:effectLst>
+            <a:outerShdw blurRad="57150" dist="19050" dir="5400000" algn="ctr" rotWithShape="0">
+              <a:srgbClr val="000000">
+                <a:alpha val="63000"/>
+              </a:srgbClr>
+            </a:outerShdw>
+          </a:effectLst>
+        </a:effectStyle>
+      </a:effectStyleLst>
+      <a:bgFillStyleLst>
+        <a:solidFill>
+          <a:schemeClr val="phClr"/>
+        </a:solidFill>
+        <a:solidFill>
+          <a:schemeClr val="phClr">
+            <a:tint val="95000"/>
+            <a:satMod val="170000"/>
+          </a:schemeClr>
+        </a:solidFill>
+        <a:gradFill rotWithShape="1">
+          <a:gsLst>
+            <a:gs pos="0">
+              <a:schemeClr val="phClr">
+                <a:tint val="93000"/>
+                <a:satMod val="150000"/>
+                <a:shade val="98000"/>
+                <a:lumMod val="102000"/>
+              </a:schemeClr>
+            </a:gs>
+            <a:gs pos="50000">
+              <a:schemeClr val="phClr">
+                <a:tint val="98000"/>
+                <a:satMod val="130000"/>
+                <a:shade val="90000"/>
+                <a:lumMod val="103000"/>
+              </a:schemeClr>
+            </a:gs>
+            <a:gs pos="100000">
+              <a:schemeClr val="phClr">
+                <a:shade val="63000"/>
+                <a:satMod val="120000"/>
+              </a:schemeClr>
+            </a:gs>
+          </a:gsLst>
+          <a:lin ang="5400000" scaled="0"/>
+        </a:gradFill>
+      </a:bgFillStyleLst>
+    </a:fmtScheme>
+  </a:themeElements>
+  <a:objectDefaults>
+    <a:lnDef>
+      <a:spPr/>
+      <a:bodyPr/>
+      <a:lstStyle/>
+      <a:style>
+        <a:lnRef idx="2">
+          <a:schemeClr val="accent1"/>
+        </a:lnRef>
+        <a:fillRef idx="0">
+          <a:schemeClr val="accent1"/>
+        </a:fillRef>
+        <a:effectRef idx="1">
+          <a:schemeClr val="accent1"/>
+        </a:effectRef>
+        <a:fontRef idx="minor">
+          <a:schemeClr val="tx1"/>
+        </a:fontRef>
+      </a:style>
+    </a:lnDef>
+  </a:objectDefaults>
+  <a:extraClrSchemeLst/>
+  <a:extLst>
+    <a:ext uri="{05A4C25C-085E-4340-85A3-A5531E510DB2}">
+      <thm15:themeFamily xmlns:thm15="http://schemas.microsoft.com/office/thememl/2012/main" name="Office Theme" id="{2E142A2C-CD16-42D6-873A-C26D2A0506FA}" vid="{1BDDFF52-6CD6-40A5-AB3C-68EB2F1E4D0A}"/>
+    </a:ext>
+  </a:extLst>
+</a:theme>
 </file>
</xml_diff>